<commit_message>
Really completed project for Yandex Liceum
</commit_message>
<xml_diff>
--- a/Presentation/Shop.pptx
+++ b/Presentation/Shop.pptx
@@ -13,7 +13,8 @@
     <p:sldId id="258" r:id="rId7"/>
     <p:sldId id="259" r:id="rId8"/>
     <p:sldId id="260" r:id="rId9"/>
-    <p:sldId id="261" r:id="rId10"/>
+    <p:sldId id="266" r:id="rId10"/>
+    <p:sldId id="261" r:id="rId11"/>
   </p:sldIdLst>
   <p:sldSz cx="12192000" cy="6858000"/>
   <p:notesSz cx="6858000" cy="9144000"/>
@@ -3435,12 +3436,94 @@
   <p:clrMapOvr>
     <a:masterClrMapping/>
   </p:clrMapOvr>
-  <mc:AlternateContent xmlns:mc="http://schemas.openxmlformats.org/markup-compatibility/2006">
-    <mc:Choice xmlns:p14="http://schemas.microsoft.com/office/powerpoint/2010/main" Requires="p14">
+  <mc:AlternateContent xmlns:mc="http://schemas.openxmlformats.org/markup-compatibility/2006" xmlns:p14="http://schemas.microsoft.com/office/powerpoint/2010/main">
+    <mc:Choice Requires="p14">
       <p:transition p14:dur="0"/>
     </mc:Choice>
-    <mc:Fallback>
+    <mc:Fallback xmlns="">
       <p:transition/>
+    </mc:Fallback>
+  </mc:AlternateContent>
+  <p:timing>
+    <p:tnLst>
+      <p:par>
+        <p:cTn id="1" dur="indefinite" restart="never" nodeType="tmRoot"/>
+      </p:par>
+    </p:tnLst>
+  </p:timing>
+</p:sld>
+</file>
+
+<file path=ppt/slides/slide10.xml><?xml version="1.0" encoding="utf-8"?>
+<p:sld xmlns:a="http://schemas.openxmlformats.org/drawingml/2006/main" xmlns:r="http://schemas.openxmlformats.org/officeDocument/2006/relationships" xmlns:p="http://schemas.openxmlformats.org/presentationml/2006/main">
+  <p:cSld>
+    <p:spTree>
+      <p:nvGrpSpPr>
+        <p:cNvPr id="1" name=""/>
+        <p:cNvGrpSpPr/>
+        <p:nvPr/>
+      </p:nvGrpSpPr>
+      <p:grpSpPr>
+        <a:xfrm>
+          <a:off x="0" y="0"/>
+          <a:ext cx="0" cy="0"/>
+          <a:chOff x="0" y="0"/>
+          <a:chExt cx="0" cy="0"/>
+        </a:xfrm>
+      </p:grpSpPr>
+      <p:sp>
+        <p:nvSpPr>
+          <p:cNvPr id="2" name="Заголовок 1">
+            <a:extLst>
+              <a:ext uri="{FF2B5EF4-FFF2-40B4-BE49-F238E27FC236}">
+                <a16:creationId xmlns:a16="http://schemas.microsoft.com/office/drawing/2014/main" id="{34FEA38E-2014-4903-A101-24C72B8A675C}"/>
+              </a:ext>
+            </a:extLst>
+          </p:cNvPr>
+          <p:cNvSpPr>
+            <a:spLocks noGrp="1"/>
+          </p:cNvSpPr>
+          <p:nvPr>
+            <p:ph type="ctrTitle"/>
+          </p:nvPr>
+        </p:nvSpPr>
+        <p:spPr/>
+        <p:txBody>
+          <a:bodyPr/>
+          <a:lstStyle/>
+          <a:p>
+            <a:r>
+              <a:rPr lang="ru-RU" dirty="0">
+                <a:solidFill>
+                  <a:schemeClr val="accent2"/>
+                </a:solidFill>
+                <a:latin typeface="Arial Black" panose="020B0A04020102020204" pitchFamily="34" charset="0"/>
+              </a:rPr>
+              <a:t>Спасибо за внимание !!!</a:t>
+            </a:r>
+          </a:p>
+        </p:txBody>
+      </p:sp>
+    </p:spTree>
+    <p:extLst>
+      <p:ext uri="{BB962C8B-B14F-4D97-AF65-F5344CB8AC3E}">
+        <p14:creationId xmlns:p14="http://schemas.microsoft.com/office/powerpoint/2010/main" val="2075506402"/>
+      </p:ext>
+    </p:extLst>
+  </p:cSld>
+  <p:clrMapOvr>
+    <a:masterClrMapping/>
+  </p:clrMapOvr>
+  <mc:AlternateContent xmlns:mc="http://schemas.openxmlformats.org/markup-compatibility/2006" xmlns:p15="http://schemas.microsoft.com/office/powerpoint/2012/main">
+    <mc:Choice Requires="p15">
+      <p:transition xmlns:p14="http://schemas.microsoft.com/office/powerpoint/2010/main" spd="slow" p14:dur="2000">
+        <p15:prstTrans prst="wind"/>
+      </p:transition>
+    </mc:Choice>
+    <mc:Fallback xmlns="">
+      <p:transition spd="slow">
+        <p:fade/>
+      </p:transition>
     </mc:Fallback>
   </mc:AlternateContent>
   <p:timing>
@@ -3502,12 +3585,6 @@
               </a:rPr>
               <a:t>Идея и задачи проекта</a:t>
             </a:r>
-            <a:endParaRPr lang="ru-RU" sz="4800" dirty="0">
-              <a:solidFill>
-                <a:schemeClr val="accent2"/>
-              </a:solidFill>
-              <a:latin typeface="Arial Black" panose="020B0A04020102020204" pitchFamily="34" charset="0"/>
-            </a:endParaRPr>
           </a:p>
         </p:txBody>
       </p:sp>
@@ -3565,13 +3642,13 @@
   <p:clrMapOvr>
     <a:masterClrMapping/>
   </p:clrMapOvr>
-  <mc:AlternateContent xmlns:mc="http://schemas.openxmlformats.org/markup-compatibility/2006">
-    <mc:Choice xmlns:p14="http://schemas.microsoft.com/office/powerpoint/2010/main" Requires="p14">
+  <mc:AlternateContent xmlns:mc="http://schemas.openxmlformats.org/markup-compatibility/2006" xmlns:p14="http://schemas.microsoft.com/office/powerpoint/2010/main">
+    <mc:Choice Requires="p14">
       <p:transition spd="slow" p14:dur="1500">
         <p:split orient="vert"/>
       </p:transition>
     </mc:Choice>
-    <mc:Fallback>
+    <mc:Fallback xmlns="">
       <p:transition spd="slow">
         <p:split orient="vert"/>
       </p:transition>
@@ -3722,25 +3799,7 @@
                 </a:solidFill>
                 <a:latin typeface="Arial Black" panose="020B0A04020102020204" pitchFamily="34" charset="0"/>
               </a:rPr>
-              <a:t>С</a:t>
-            </a:r>
-            <a:r>
-              <a:rPr lang="ru-RU" sz="4800" dirty="0">
-                <a:solidFill>
-                  <a:schemeClr val="accent2"/>
-                </a:solidFill>
-                <a:latin typeface="Arial Black" panose="020B0A04020102020204" pitchFamily="34" charset="0"/>
-              </a:rPr>
-              <a:t>труктура и</a:t>
-            </a:r>
-            <a:r>
-              <a:rPr lang="ru-RU" sz="4800" dirty="0">
-                <a:solidFill>
-                  <a:schemeClr val="accent2"/>
-                </a:solidFill>
-                <a:latin typeface="Arial Black" panose="020B0A04020102020204" pitchFamily="34" charset="0"/>
-              </a:rPr>
-              <a:t> особенности </a:t>
+              <a:t>Структура и особенности </a:t>
             </a:r>
             <a:r>
               <a:rPr lang="ru-RU" sz="4800" dirty="0" smtClean="0">
@@ -3887,12 +3946,6 @@
               </a:rPr>
               <a:t>Пример универсального блока для вывода любой категории товаров</a:t>
             </a:r>
-            <a:endParaRPr lang="ru-RU" sz="3200" dirty="0">
-              <a:solidFill>
-                <a:schemeClr val="accent2"/>
-              </a:solidFill>
-              <a:latin typeface="Arial Black" panose="020B0A04020102020204" pitchFamily="34" charset="0"/>
-            </a:endParaRPr>
           </a:p>
         </p:txBody>
       </p:sp>
@@ -3965,13 +4018,13 @@
   <p:clrMapOvr>
     <a:masterClrMapping/>
   </p:clrMapOvr>
-  <mc:AlternateContent xmlns:mc="http://schemas.openxmlformats.org/markup-compatibility/2006">
-    <mc:Choice xmlns:p15="http://schemas.microsoft.com/office/powerpoint/2012/main" Requires="p15">
+  <mc:AlternateContent xmlns:mc="http://schemas.openxmlformats.org/markup-compatibility/2006" xmlns:p15="http://schemas.microsoft.com/office/powerpoint/2012/main">
+    <mc:Choice Requires="p15">
       <p:transition xmlns:p14="http://schemas.microsoft.com/office/powerpoint/2010/main" spd="slow" p14:dur="2000">
         <p15:prstTrans prst="fallOver"/>
       </p:transition>
     </mc:Choice>
-    <mc:Fallback>
+    <mc:Fallback xmlns="">
       <p:transition spd="slow">
         <p:fade/>
       </p:transition>
@@ -4080,21 +4133,8 @@
           <a:p>
             <a:r>
               <a:rPr lang="ru-RU" dirty="0"/>
-              <a:t>У товаров есть </a:t>
-            </a:r>
-            <a:r>
-              <a:rPr lang="ru-RU" dirty="0"/>
-              <a:t>категория(Автоматически создаётся в базе данных когда </a:t>
-            </a:r>
-            <a:r>
-              <a:rPr lang="ru-RU" dirty="0"/>
-              <a:t>упоминается при создании товаров</a:t>
-            </a:r>
-            <a:r>
-              <a:rPr lang="ru-RU" dirty="0"/>
-              <a:t>)</a:t>
-            </a:r>
-            <a:endParaRPr lang="ru-RU" dirty="0"/>
+              <a:t>У товаров есть категория(Автоматически создаётся в базе данных когда упоминается при создании товаров)</a:t>
+            </a:r>
           </a:p>
         </p:txBody>
       </p:sp>
@@ -4108,13 +4148,13 @@
   <p:clrMapOvr>
     <a:masterClrMapping/>
   </p:clrMapOvr>
-  <mc:AlternateContent xmlns:mc="http://schemas.openxmlformats.org/markup-compatibility/2006">
-    <mc:Choice xmlns:p14="http://schemas.microsoft.com/office/powerpoint/2010/main" Requires="p14">
+  <mc:AlternateContent xmlns:mc="http://schemas.openxmlformats.org/markup-compatibility/2006" xmlns:p14="http://schemas.microsoft.com/office/powerpoint/2010/main">
+    <mc:Choice Requires="p14">
       <p:transition spd="slow" p14:dur="1300">
         <p14:pan dir="u"/>
       </p:transition>
     </mc:Choice>
-    <mc:Fallback>
+    <mc:Fallback xmlns="">
       <p:transition spd="slow">
         <p:fade/>
       </p:transition>
@@ -4291,16 +4331,7 @@
                 </a:solidFill>
                 <a:latin typeface="Arial Black" panose="020B0A04020102020204" pitchFamily="34" charset="0"/>
               </a:rPr>
-              <a:t>Файловая структура</a:t>
-            </a:r>
-            <a:r>
-              <a:rPr lang="ru-RU" dirty="0" smtClean="0">
-                <a:solidFill>
-                  <a:schemeClr val="accent2"/>
-                </a:solidFill>
-                <a:latin typeface="Arial Black" panose="020B0A04020102020204" pitchFamily="34" charset="0"/>
-              </a:rPr>
-              <a:t> </a:t>
+              <a:t>Файловая структура </a:t>
             </a:r>
             <a:r>
               <a:rPr lang="ru-RU" dirty="0">
@@ -4383,13 +4414,13 @@
   <p:clrMapOvr>
     <a:masterClrMapping/>
   </p:clrMapOvr>
-  <mc:AlternateContent xmlns:mc="http://schemas.openxmlformats.org/markup-compatibility/2006">
-    <mc:Choice xmlns:p14="http://schemas.microsoft.com/office/powerpoint/2010/main" Requires="p14">
+  <mc:AlternateContent xmlns:mc="http://schemas.openxmlformats.org/markup-compatibility/2006" xmlns:p14="http://schemas.microsoft.com/office/powerpoint/2010/main">
+    <mc:Choice Requires="p14">
       <p:transition spd="slow" p14:dur="800">
         <p:circle/>
       </p:transition>
     </mc:Choice>
-    <mc:Fallback>
+    <mc:Fallback xmlns="">
       <p:transition spd="slow">
         <p:circle/>
       </p:transition>
@@ -4424,59 +4455,137 @@
       </p:grpSpPr>
       <p:sp>
         <p:nvSpPr>
-          <p:cNvPr id="2" name="Заголовок 1">
-            <a:extLst>
-              <a:ext uri="{FF2B5EF4-FFF2-40B4-BE49-F238E27FC236}">
-                <a16:creationId xmlns:a16="http://schemas.microsoft.com/office/drawing/2014/main" id="{34FEA38E-2014-4903-A101-24C72B8A675C}"/>
-              </a:ext>
-            </a:extLst>
-          </p:cNvPr>
-          <p:cNvSpPr>
-            <a:spLocks noGrp="1"/>
-          </p:cNvSpPr>
-          <p:nvPr>
-            <p:ph type="ctrTitle"/>
-          </p:nvPr>
-        </p:nvSpPr>
-        <p:spPr/>
-        <p:txBody>
-          <a:bodyPr/>
-          <a:lstStyle/>
-          <a:p>
-            <a:r>
-              <a:rPr lang="ru-RU" dirty="0">
+          <p:cNvPr id="2" name="Заголовок 1"/>
+          <p:cNvSpPr>
+            <a:spLocks noGrp="1"/>
+          </p:cNvSpPr>
+          <p:nvPr>
+            <p:ph type="title"/>
+          </p:nvPr>
+        </p:nvSpPr>
+        <p:spPr>
+          <a:xfrm>
+            <a:off x="838200" y="108751"/>
+            <a:ext cx="10515600" cy="1325563"/>
+          </a:xfrm>
+        </p:spPr>
+        <p:txBody>
+          <a:bodyPr>
+            <a:normAutofit/>
+          </a:bodyPr>
+          <a:lstStyle/>
+          <a:p>
+            <a:pPr algn="ctr"/>
+            <a:r>
+              <a:rPr lang="ru-RU" sz="4800" dirty="0">
                 <a:solidFill>
                   <a:schemeClr val="accent2"/>
                 </a:solidFill>
                 <a:latin typeface="Arial Black" panose="020B0A04020102020204" pitchFamily="34" charset="0"/>
               </a:rPr>
-              <a:t>Спасибо за внимание !!!</a:t>
-            </a:r>
+              <a:t>Выводы и планы развития</a:t>
+            </a:r>
+            <a:endParaRPr lang="ru-RU" sz="4800" dirty="0">
+              <a:solidFill>
+                <a:schemeClr val="accent2"/>
+              </a:solidFill>
+              <a:latin typeface="Arial Black" panose="020B0A04020102020204" pitchFamily="34" charset="0"/>
+            </a:endParaRPr>
+          </a:p>
+        </p:txBody>
+      </p:sp>
+      <p:sp>
+        <p:nvSpPr>
+          <p:cNvPr id="3" name="Объект 2"/>
+          <p:cNvSpPr>
+            <a:spLocks noGrp="1"/>
+          </p:cNvSpPr>
+          <p:nvPr>
+            <p:ph idx="1"/>
+          </p:nvPr>
+        </p:nvSpPr>
+        <p:spPr>
+          <a:xfrm>
+            <a:off x="838200" y="1434314"/>
+            <a:ext cx="10515600" cy="4742649"/>
+          </a:xfrm>
+        </p:spPr>
+        <p:txBody>
+          <a:bodyPr/>
+          <a:lstStyle/>
+          <a:p>
+            <a:r>
+              <a:rPr lang="ru-RU" dirty="0" smtClean="0"/>
+              <a:t>Разработать корзину</a:t>
+            </a:r>
+          </a:p>
+          <a:p>
+            <a:r>
+              <a:rPr lang="ru-RU" dirty="0" smtClean="0"/>
+              <a:t>Поменять карточки на красивые в каталоге</a:t>
+            </a:r>
+          </a:p>
+          <a:p>
+            <a:r>
+              <a:rPr lang="ru-RU" dirty="0" smtClean="0"/>
+              <a:t>Доработать обработчик по показу товаров по категориям</a:t>
+            </a:r>
+          </a:p>
+          <a:p>
+            <a:r>
+              <a:rPr lang="ru-RU" dirty="0" smtClean="0"/>
+              <a:t>Интеграция Яндекс </a:t>
+            </a:r>
+            <a:r>
+              <a:rPr lang="en-US" dirty="0" smtClean="0"/>
+              <a:t>Maps </a:t>
+            </a:r>
+            <a:r>
+              <a:rPr lang="ru-RU" dirty="0" smtClean="0"/>
+              <a:t>в сайт в раздел </a:t>
+            </a:r>
+            <a:r>
+              <a:rPr lang="en-US" dirty="0" smtClean="0"/>
+              <a:t>/contacts</a:t>
+            </a:r>
+          </a:p>
+          <a:p>
+            <a:r>
+              <a:rPr lang="ru-RU" dirty="0" smtClean="0"/>
+              <a:t>Доработать дизайн карточек, чтобы все были одного размера</a:t>
+            </a:r>
+          </a:p>
+          <a:p>
+            <a:r>
+              <a:rPr lang="ru-RU" dirty="0" smtClean="0"/>
+              <a:t>Изменить дизайн кнопок и сделать сайт более гармоничным</a:t>
+            </a:r>
+          </a:p>
+          <a:p>
+            <a:pPr marL="0" indent="0">
+              <a:buNone/>
+            </a:pPr>
+            <a:r>
+              <a:rPr lang="ru-RU" sz="800" dirty="0" smtClean="0"/>
+              <a:t>*Ещё меньше заботиться о покупателях</a:t>
+            </a:r>
+            <a:endParaRPr lang="ru-RU" sz="800" dirty="0"/>
           </a:p>
         </p:txBody>
       </p:sp>
     </p:spTree>
     <p:extLst>
       <p:ext uri="{BB962C8B-B14F-4D97-AF65-F5344CB8AC3E}">
-        <p14:creationId xmlns:p14="http://schemas.microsoft.com/office/powerpoint/2010/main" val="2075506402"/>
+        <p14:creationId xmlns:p14="http://schemas.microsoft.com/office/powerpoint/2010/main" val="2866917389"/>
       </p:ext>
     </p:extLst>
   </p:cSld>
   <p:clrMapOvr>
     <a:masterClrMapping/>
   </p:clrMapOvr>
-  <mc:AlternateContent xmlns:mc="http://schemas.openxmlformats.org/markup-compatibility/2006">
-    <mc:Choice xmlns:p15="http://schemas.microsoft.com/office/powerpoint/2012/main" Requires="p15">
-      <p:transition xmlns:p14="http://schemas.microsoft.com/office/powerpoint/2010/main" spd="slow" p14:dur="2000">
-        <p15:prstTrans prst="wind"/>
-      </p:transition>
-    </mc:Choice>
-    <mc:Fallback>
-      <p:transition spd="slow">
-        <p:fade/>
-      </p:transition>
-    </mc:Fallback>
-  </mc:AlternateContent>
+  <p:transition spd="slow">
+    <p:wheel spokes="1"/>
+  </p:transition>
   <p:timing>
     <p:tnLst>
       <p:par>

</xml_diff>